<commit_message>
Update L14_L15 slides, case recog alg and update remove instructions
</commit_message>
<xml_diff>
--- a/slides/L14_15_avl.pptx
+++ b/slides/L14_15_avl.pptx
@@ -5,7 +5,7 @@
     <p:sldMasterId id="2147483648" r:id="rId1"/>
   </p:sldMasterIdLst>
   <p:notesMasterIdLst>
-    <p:notesMasterId r:id="rId41"/>
+    <p:notesMasterId r:id="rId42"/>
   </p:notesMasterIdLst>
   <p:sldIdLst>
     <p:sldId id="256" r:id="rId2"/>
@@ -35,18 +35,19 @@
     <p:sldId id="593" r:id="rId26"/>
     <p:sldId id="594" r:id="rId27"/>
     <p:sldId id="599" r:id="rId28"/>
-    <p:sldId id="595" r:id="rId29"/>
-    <p:sldId id="596" r:id="rId30"/>
-    <p:sldId id="597" r:id="rId31"/>
-    <p:sldId id="598" r:id="rId32"/>
-    <p:sldId id="605" r:id="rId33"/>
-    <p:sldId id="600" r:id="rId34"/>
-    <p:sldId id="607" r:id="rId35"/>
-    <p:sldId id="601" r:id="rId36"/>
-    <p:sldId id="608" r:id="rId37"/>
-    <p:sldId id="602" r:id="rId38"/>
-    <p:sldId id="606" r:id="rId39"/>
-    <p:sldId id="603" r:id="rId40"/>
+    <p:sldId id="609" r:id="rId29"/>
+    <p:sldId id="595" r:id="rId30"/>
+    <p:sldId id="596" r:id="rId31"/>
+    <p:sldId id="597" r:id="rId32"/>
+    <p:sldId id="598" r:id="rId33"/>
+    <p:sldId id="605" r:id="rId34"/>
+    <p:sldId id="600" r:id="rId35"/>
+    <p:sldId id="607" r:id="rId36"/>
+    <p:sldId id="601" r:id="rId37"/>
+    <p:sldId id="608" r:id="rId38"/>
+    <p:sldId id="602" r:id="rId39"/>
+    <p:sldId id="606" r:id="rId40"/>
+    <p:sldId id="603" r:id="rId41"/>
   </p:sldIdLst>
   <p:sldSz cx="12192000" cy="6858000"/>
   <p:notesSz cx="6858000" cy="9144000"/>
@@ -235,7 +236,7 @@
           <a:p>
             <a:fld id="{C2FCE99B-E973-465D-BB53-BF21AF75883F}" type="datetimeFigureOut">
               <a:rPr lang="en-US" smtClean="0"/>
-              <a:t>7/17/24</a:t>
+              <a:t>7/18/2024</a:t>
             </a:fld>
             <a:endParaRPr lang="en-US"/>
           </a:p>
@@ -574,7 +575,7 @@
           <a:p>
             <a:fld id="{FBE48926-79B2-4DAB-B867-7B8DB7F4F70F}" type="slidenum">
               <a:rPr lang="en-US" smtClean="0"/>
-              <a:t>31</a:t>
+              <a:t>32</a:t>
             </a:fld>
             <a:endParaRPr lang="en-US"/>
           </a:p>
@@ -772,7 +773,7 @@
           <a:p>
             <a:fld id="{C4A562D2-D35A-4C1C-893A-1764FF42E2B8}" type="datetimeFigureOut">
               <a:rPr lang="en-US" smtClean="0"/>
-              <a:t>7/17/24</a:t>
+              <a:t>7/18/2024</a:t>
             </a:fld>
             <a:endParaRPr lang="en-US"/>
           </a:p>
@@ -970,7 +971,7 @@
           <a:p>
             <a:fld id="{C4A562D2-D35A-4C1C-893A-1764FF42E2B8}" type="datetimeFigureOut">
               <a:rPr lang="en-US" smtClean="0"/>
-              <a:t>7/17/24</a:t>
+              <a:t>7/18/2024</a:t>
             </a:fld>
             <a:endParaRPr lang="en-US"/>
           </a:p>
@@ -1178,7 +1179,7 @@
           <a:p>
             <a:fld id="{C4A562D2-D35A-4C1C-893A-1764FF42E2B8}" type="datetimeFigureOut">
               <a:rPr lang="en-US" smtClean="0"/>
-              <a:t>7/17/24</a:t>
+              <a:t>7/18/2024</a:t>
             </a:fld>
             <a:endParaRPr lang="en-US"/>
           </a:p>
@@ -1376,7 +1377,7 @@
           <a:p>
             <a:fld id="{C4A562D2-D35A-4C1C-893A-1764FF42E2B8}" type="datetimeFigureOut">
               <a:rPr lang="en-US" smtClean="0"/>
-              <a:t>7/17/24</a:t>
+              <a:t>7/18/2024</a:t>
             </a:fld>
             <a:endParaRPr lang="en-US"/>
           </a:p>
@@ -1651,7 +1652,7 @@
           <a:p>
             <a:fld id="{C4A562D2-D35A-4C1C-893A-1764FF42E2B8}" type="datetimeFigureOut">
               <a:rPr lang="en-US" smtClean="0"/>
-              <a:t>7/17/24</a:t>
+              <a:t>7/18/2024</a:t>
             </a:fld>
             <a:endParaRPr lang="en-US"/>
           </a:p>
@@ -1916,7 +1917,7 @@
           <a:p>
             <a:fld id="{C4A562D2-D35A-4C1C-893A-1764FF42E2B8}" type="datetimeFigureOut">
               <a:rPr lang="en-US" smtClean="0"/>
-              <a:t>7/17/24</a:t>
+              <a:t>7/18/2024</a:t>
             </a:fld>
             <a:endParaRPr lang="en-US"/>
           </a:p>
@@ -2328,7 +2329,7 @@
           <a:p>
             <a:fld id="{C4A562D2-D35A-4C1C-893A-1764FF42E2B8}" type="datetimeFigureOut">
               <a:rPr lang="en-US" smtClean="0"/>
-              <a:t>7/17/24</a:t>
+              <a:t>7/18/2024</a:t>
             </a:fld>
             <a:endParaRPr lang="en-US"/>
           </a:p>
@@ -2469,7 +2470,7 @@
           <a:p>
             <a:fld id="{C4A562D2-D35A-4C1C-893A-1764FF42E2B8}" type="datetimeFigureOut">
               <a:rPr lang="en-US" smtClean="0"/>
-              <a:t>7/17/24</a:t>
+              <a:t>7/18/2024</a:t>
             </a:fld>
             <a:endParaRPr lang="en-US"/>
           </a:p>
@@ -2582,7 +2583,7 @@
           <a:p>
             <a:fld id="{C4A562D2-D35A-4C1C-893A-1764FF42E2B8}" type="datetimeFigureOut">
               <a:rPr lang="en-US" smtClean="0"/>
-              <a:t>7/17/24</a:t>
+              <a:t>7/18/2024</a:t>
             </a:fld>
             <a:endParaRPr lang="en-US"/>
           </a:p>
@@ -2893,7 +2894,7 @@
           <a:p>
             <a:fld id="{C4A562D2-D35A-4C1C-893A-1764FF42E2B8}" type="datetimeFigureOut">
               <a:rPr lang="en-US" smtClean="0"/>
-              <a:t>7/17/24</a:t>
+              <a:t>7/18/2024</a:t>
             </a:fld>
             <a:endParaRPr lang="en-US"/>
           </a:p>
@@ -3181,7 +3182,7 @@
           <a:p>
             <a:fld id="{C4A562D2-D35A-4C1C-893A-1764FF42E2B8}" type="datetimeFigureOut">
               <a:rPr lang="en-US" smtClean="0"/>
-              <a:t>7/17/24</a:t>
+              <a:t>7/18/2024</a:t>
             </a:fld>
             <a:endParaRPr lang="en-US"/>
           </a:p>
@@ -3422,7 +3423,7 @@
           <a:p>
             <a:fld id="{C4A562D2-D35A-4C1C-893A-1764FF42E2B8}" type="datetimeFigureOut">
               <a:rPr lang="en-US" smtClean="0"/>
-              <a:t>7/17/24</a:t>
+              <a:t>7/18/2024</a:t>
             </a:fld>
             <a:endParaRPr lang="en-US"/>
           </a:p>
@@ -8454,7 +8455,7 @@
         </p:spPr>
         <p:txBody>
           <a:bodyPr>
-            <a:normAutofit lnSpcReduction="10000"/>
+            <a:normAutofit fontScale="85000" lnSpcReduction="20000"/>
           </a:bodyPr>
           <a:lstStyle/>
           <a:p>
@@ -8501,6 +8502,36 @@
           <a:p>
             <a:r>
               <a:rPr lang="en-US" dirty="0"/>
+              <a:t>When right-rotating y, x must not be null. When left-rotating x, y must not be null. </a:t>
+            </a:r>
+            <a:r>
+              <a:rPr lang="el-GR" dirty="0"/>
+              <a:t>α</a:t>
+            </a:r>
+            <a:r>
+              <a:rPr lang="en-US" dirty="0"/>
+              <a:t>,</a:t>
+            </a:r>
+            <a:r>
+              <a:rPr lang="el-GR" dirty="0"/>
+              <a:t> β</a:t>
+            </a:r>
+            <a:r>
+              <a:rPr lang="en-US" dirty="0"/>
+              <a:t>,</a:t>
+            </a:r>
+            <a:r>
+              <a:rPr lang="el-GR" dirty="0"/>
+              <a:t> γ</a:t>
+            </a:r>
+            <a:r>
+              <a:rPr lang="en-US" dirty="0"/>
+              <a:t> may be null</a:t>
+            </a:r>
+          </a:p>
+          <a:p>
+            <a:r>
+              <a:rPr lang="en-US" dirty="0"/>
               <a:t>Check BST inequalities</a:t>
             </a:r>
           </a:p>
@@ -8519,11 +8550,8 @@
             </a:r>
             <a:r>
               <a:rPr lang="en-US" dirty="0"/>
-              <a:t> parent link is moving</a:t>
-            </a:r>
-          </a:p>
-          <a:p>
-            <a:pPr lvl="1"/>
+              <a:t> parent link is moving, </a:t>
+            </a:r>
             <a:r>
               <a:rPr lang="el-GR" dirty="0"/>
               <a:t>β</a:t>
@@ -8540,10 +8568,6 @@
               <a:rPr lang="en-US" dirty="0"/>
               <a:t> &lt; y on both sides</a:t>
             </a:r>
-          </a:p>
-          <a:p>
-            <a:pPr lvl="1"/>
-            <a:endParaRPr lang="en-US" dirty="0"/>
           </a:p>
         </p:txBody>
       </p:sp>
@@ -11913,7 +11937,7 @@
         </p:spPr>
         <p:txBody>
           <a:bodyPr vert="horz" lIns="91440" tIns="45720" rIns="91440" bIns="45720" rtlCol="0">
-            <a:normAutofit fontScale="77500" lnSpcReduction="20000"/>
+            <a:normAutofit fontScale="70000" lnSpcReduction="20000"/>
           </a:bodyPr>
           <a:lstStyle>
             <a:lvl1pPr marL="228600" indent="-228600" algn="l" defTabSz="914400" rtl="0" eaLnBrk="1" latinLnBrk="0" hangingPunct="1">
@@ -12169,6 +12193,44 @@
             <a:r>
               <a:rPr lang="en-US" dirty="0"/>
               <a:t> are not imbalanced (before and now), otherwise either of those would be the first place there is imbalance</a:t>
+            </a:r>
+          </a:p>
+          <a:p>
+            <a:r>
+              <a:rPr lang="en-US" dirty="0">
+                <a:highlight>
+                  <a:srgbClr val="FF00FF"/>
+                </a:highlight>
+              </a:rPr>
+              <a:t>z</a:t>
+            </a:r>
+            <a:r>
+              <a:rPr lang="en-US" dirty="0"/>
+              <a:t>, </a:t>
+            </a:r>
+            <a:r>
+              <a:rPr lang="en-US" dirty="0">
+                <a:highlight>
+                  <a:srgbClr val="00FFFF"/>
+                </a:highlight>
+              </a:rPr>
+              <a:t>x</a:t>
+            </a:r>
+            <a:r>
+              <a:rPr lang="en-US" dirty="0"/>
+              <a:t>, </a:t>
+            </a:r>
+            <a:r>
+              <a:rPr lang="en-US" dirty="0">
+                <a:highlight>
+                  <a:srgbClr val="00FFFF"/>
+                </a:highlight>
+              </a:rPr>
+              <a:t>y</a:t>
+            </a:r>
+            <a:r>
+              <a:rPr lang="en-US" dirty="0"/>
+              <a:t> must be non-null. A, B, C, D may be null</a:t>
             </a:r>
           </a:p>
         </p:txBody>
@@ -33766,19 +33828,19 @@
         <p:spPr/>
         <p:txBody>
           <a:bodyPr>
-            <a:normAutofit fontScale="85000" lnSpcReduction="10000"/>
+            <a:normAutofit fontScale="85000" lnSpcReduction="20000"/>
           </a:bodyPr>
           <a:lstStyle/>
           <a:p>
             <a:r>
               <a:rPr lang="en-US" dirty="0"/>
-              <a:t>Overall, very similar to insert. Do the remove as normal and then check if there is imbalance. If so, rotate</a:t>
+              <a:t>Overall, similar to insert. Do the remove as normal and then check if there is imbalance. If so, rotate</a:t>
             </a:r>
           </a:p>
           <a:p>
             <a:r>
               <a:rPr lang="en-US" dirty="0"/>
-              <a:t>For imbalance, check starting from the following places</a:t>
+              <a:t>For imbalance, check starting from the parent of the actually deleted node</a:t>
             </a:r>
           </a:p>
           <a:p>
@@ -33792,14 +33854,21 @@
             <a:pPr lvl="1"/>
             <a:r>
               <a:rPr lang="en-US" dirty="0"/>
-              <a:t>For 0-child, we unlink the node to be removed. Check starting from its parent</a:t>
+              <a:t>For 0-child, we simply unlink the node to be removed. Check starting from its parent</a:t>
             </a:r>
           </a:p>
           <a:p>
             <a:pPr lvl="1"/>
             <a:r>
               <a:rPr lang="en-US" dirty="0"/>
-              <a:t>For 1-child, we make the removed node’s parent point to the removed node’s child. Check starting at the removed node’s child (which is now where the removed node was)</a:t>
+              <a:t>For 1-child, we make the removed node’s parent point to the removed node’s child. Check starting from the removed node’s parent</a:t>
+            </a:r>
+          </a:p>
+          <a:p>
+            <a:pPr lvl="2"/>
+            <a:r>
+              <a:rPr lang="en-US" dirty="0"/>
+              <a:t>The removed node’s child was balanced and will still be balanced because the heights of its subtrees don’t change</a:t>
             </a:r>
           </a:p>
           <a:p>
@@ -33819,7 +33888,14 @@
           <a:p>
             <a:r>
               <a:rPr lang="en-US" dirty="0"/>
-              <a:t>Then recognize and handle the LL, RR, LR, RL cases as we have seen with insertion</a:t>
+              <a:t>May get LL, RR, LR, or RL case as with insertion. Case recognition is different, however (next slide)</a:t>
+            </a:r>
+          </a:p>
+          <a:p>
+            <a:pPr lvl="1"/>
+            <a:r>
+              <a:rPr lang="en-US" dirty="0"/>
+              <a:t>May have to rotate on a node not on the path to the deleted node</a:t>
             </a:r>
           </a:p>
         </p:txBody>
@@ -33859,7 +33935,7 @@
           <p:cNvPr id="2" name="Title 1">
             <a:extLst>
               <a:ext uri="{FF2B5EF4-FFF2-40B4-BE49-F238E27FC236}">
-                <a16:creationId xmlns:a16="http://schemas.microsoft.com/office/drawing/2014/main" id="{743F05EF-66C4-BB26-FED6-D230C1394EB3}"/>
+                <a16:creationId xmlns:a16="http://schemas.microsoft.com/office/drawing/2014/main" id="{EFB77411-16EA-E1B9-19FA-00255130AD78}"/>
               </a:ext>
             </a:extLst>
           </p:cNvPr>
@@ -33877,7 +33953,7 @@
           <a:p>
             <a:r>
               <a:rPr lang="en-US" dirty="0"/>
-              <a:t>AVL path lengths</a:t>
+              <a:t>LL, RR, LR, RL case recognition for delete</a:t>
             </a:r>
           </a:p>
         </p:txBody>
@@ -33887,7 +33963,7 @@
           <p:cNvPr id="3" name="Content Placeholder 2">
             <a:extLst>
               <a:ext uri="{FF2B5EF4-FFF2-40B4-BE49-F238E27FC236}">
-                <a16:creationId xmlns:a16="http://schemas.microsoft.com/office/drawing/2014/main" id="{C8E668C4-1BB2-BA4D-B704-5B0041EA5E37}"/>
+                <a16:creationId xmlns:a16="http://schemas.microsoft.com/office/drawing/2014/main" id="{4A1D5EC7-0959-2478-4778-1E7C847393E3}"/>
               </a:ext>
             </a:extLst>
           </p:cNvPr>
@@ -33900,61 +33976,453 @@
         </p:nvSpPr>
         <p:spPr>
           <a:xfrm>
-            <a:off x="838200" y="1825625"/>
-            <a:ext cx="5257800" cy="4351338"/>
+            <a:off x="838200" y="1464906"/>
+            <a:ext cx="10515600" cy="5393094"/>
           </a:xfrm>
         </p:spPr>
         <p:txBody>
-          <a:bodyPr/>
+          <a:bodyPr>
+            <a:normAutofit fontScale="62500" lnSpcReduction="20000"/>
+          </a:bodyPr>
           <a:lstStyle/>
           <a:p>
             <a:r>
               <a:rPr lang="en-US" dirty="0"/>
-              <a:t>In a complete BT, paths root to leaf differ by at most 1</a:t>
+              <a:t>Let imbalance point be </a:t>
+            </a:r>
+            <a:r>
+              <a:rPr lang="en-US" dirty="0">
+                <a:highlight>
+                  <a:srgbClr val="FF00FF"/>
+                </a:highlight>
+              </a:rPr>
+              <a:t>z</a:t>
+            </a:r>
+            <a:r>
+              <a:rPr lang="en-US" dirty="0"/>
+              <a:t> (i.e., balance factor &gt; 1) and let </a:t>
+            </a:r>
+            <a:r>
+              <a:rPr lang="en-US" dirty="0" err="1"/>
+              <a:t>h</a:t>
+            </a:r>
+            <a:r>
+              <a:rPr lang="en-US" baseline="-25000" dirty="0" err="1"/>
+              <a:t>L</a:t>
+            </a:r>
+            <a:r>
+              <a:rPr lang="en-US" dirty="0"/>
+              <a:t> and </a:t>
+            </a:r>
+            <a:r>
+              <a:rPr lang="en-US" dirty="0" err="1"/>
+              <a:t>h</a:t>
+            </a:r>
+            <a:r>
+              <a:rPr lang="en-US" baseline="-25000" dirty="0" err="1"/>
+              <a:t>R</a:t>
+            </a:r>
+            <a:r>
+              <a:rPr lang="en-US" dirty="0"/>
+              <a:t> denote heights of left and right subtrees</a:t>
+            </a:r>
+            <a:endParaRPr lang="en-US" baseline="-25000" dirty="0"/>
+          </a:p>
+          <a:p>
+            <a:endParaRPr lang="en-US" baseline="-25000" dirty="0"/>
+          </a:p>
+          <a:p>
+            <a:pPr marL="0" indent="0">
+              <a:buNone/>
+            </a:pPr>
+            <a:r>
+              <a:rPr lang="en-US" dirty="0"/>
+              <a:t>if </a:t>
+            </a:r>
+            <a:r>
+              <a:rPr lang="en-US" dirty="0" err="1">
+                <a:solidFill>
+                  <a:schemeClr val="accent1">
+                    <a:lumMod val="60000"/>
+                    <a:lumOff val="40000"/>
+                  </a:schemeClr>
+                </a:solidFill>
+              </a:rPr>
+              <a:t>z.h</a:t>
+            </a:r>
+            <a:r>
+              <a:rPr lang="en-US" baseline="-25000" dirty="0" err="1">
+                <a:solidFill>
+                  <a:schemeClr val="accent1">
+                    <a:lumMod val="60000"/>
+                    <a:lumOff val="40000"/>
+                  </a:schemeClr>
+                </a:solidFill>
+              </a:rPr>
+              <a:t>L</a:t>
+            </a:r>
+            <a:r>
+              <a:rPr lang="en-US" dirty="0">
+                <a:solidFill>
+                  <a:schemeClr val="accent1">
+                    <a:lumMod val="60000"/>
+                    <a:lumOff val="40000"/>
+                  </a:schemeClr>
+                </a:solidFill>
+              </a:rPr>
+              <a:t> &gt; </a:t>
+            </a:r>
+            <a:r>
+              <a:rPr lang="en-US" dirty="0" err="1">
+                <a:solidFill>
+                  <a:schemeClr val="accent1">
+                    <a:lumMod val="60000"/>
+                    <a:lumOff val="40000"/>
+                  </a:schemeClr>
+                </a:solidFill>
+              </a:rPr>
+              <a:t>z.h</a:t>
+            </a:r>
+            <a:r>
+              <a:rPr lang="en-US" baseline="-25000" dirty="0" err="1">
+                <a:solidFill>
+                  <a:schemeClr val="accent1">
+                    <a:lumMod val="60000"/>
+                    <a:lumOff val="40000"/>
+                  </a:schemeClr>
+                </a:solidFill>
+              </a:rPr>
+              <a:t>R</a:t>
+            </a:r>
+            <a:r>
+              <a:rPr lang="en-US" dirty="0"/>
+              <a:t>	</a:t>
+            </a:r>
+            <a:r>
+              <a:rPr lang="en-US" dirty="0">
+                <a:solidFill>
+                  <a:schemeClr val="bg2">
+                    <a:lumMod val="75000"/>
+                  </a:schemeClr>
+                </a:solidFill>
+              </a:rPr>
+              <a:t>// </a:t>
+            </a:r>
+            <a:r>
+              <a:rPr lang="en-US" dirty="0">
+                <a:solidFill>
+                  <a:schemeClr val="accent1">
+                    <a:lumMod val="60000"/>
+                    <a:lumOff val="40000"/>
+                  </a:schemeClr>
+                </a:solidFill>
+              </a:rPr>
+              <a:t>L</a:t>
+            </a:r>
+            <a:r>
+              <a:rPr lang="en-US" dirty="0">
+                <a:solidFill>
+                  <a:schemeClr val="bg2">
+                    <a:lumMod val="75000"/>
+                  </a:schemeClr>
+                </a:solidFill>
+              </a:rPr>
+              <a:t>x case, but need to figure out which</a:t>
+            </a:r>
+          </a:p>
+          <a:p>
+            <a:pPr marL="0" indent="0">
+              <a:buNone/>
+            </a:pPr>
+            <a:r>
+              <a:rPr lang="en-US" dirty="0"/>
+              <a:t>	if </a:t>
+            </a:r>
+            <a:r>
+              <a:rPr lang="en-US" dirty="0" err="1"/>
+              <a:t>z.left.h</a:t>
+            </a:r>
+            <a:r>
+              <a:rPr lang="en-US" baseline="-25000" dirty="0" err="1">
+                <a:solidFill>
+                  <a:schemeClr val="accent5"/>
+                </a:solidFill>
+              </a:rPr>
+              <a:t>R</a:t>
+            </a:r>
+            <a:r>
+              <a:rPr lang="en-US" dirty="0"/>
+              <a:t> &gt; </a:t>
+            </a:r>
+            <a:r>
+              <a:rPr lang="en-US" dirty="0" err="1"/>
+              <a:t>z.left.h</a:t>
+            </a:r>
+            <a:r>
+              <a:rPr lang="en-US" baseline="-25000" dirty="0" err="1"/>
+              <a:t>L</a:t>
+            </a:r>
+            <a:endParaRPr lang="en-US" baseline="-25000" dirty="0"/>
+          </a:p>
+          <a:p>
+            <a:pPr marL="0" indent="0">
+              <a:buNone/>
+            </a:pPr>
+            <a:r>
+              <a:rPr lang="en-US" dirty="0"/>
+              <a:t>		L</a:t>
+            </a:r>
+            <a:r>
+              <a:rPr lang="en-US" dirty="0">
+                <a:solidFill>
+                  <a:schemeClr val="accent5"/>
+                </a:solidFill>
+              </a:rPr>
+              <a:t>R</a:t>
+            </a:r>
+            <a:r>
+              <a:rPr lang="en-US" dirty="0"/>
+              <a:t> case</a:t>
+            </a:r>
+          </a:p>
+          <a:p>
+            <a:pPr marL="0" indent="0">
+              <a:buNone/>
+            </a:pPr>
+            <a:r>
+              <a:rPr lang="en-US" dirty="0"/>
+              <a:t>	else</a:t>
+            </a:r>
+          </a:p>
+          <a:p>
+            <a:pPr marL="0" indent="0">
+              <a:buNone/>
+            </a:pPr>
+            <a:r>
+              <a:rPr lang="en-US" dirty="0"/>
+              <a:t>		LL case</a:t>
+            </a:r>
+          </a:p>
+          <a:p>
+            <a:pPr marL="0" indent="0">
+              <a:buNone/>
+            </a:pPr>
+            <a:r>
+              <a:rPr lang="en-US" dirty="0"/>
+              <a:t>else		</a:t>
+            </a:r>
+            <a:r>
+              <a:rPr lang="en-US" dirty="0">
+                <a:solidFill>
+                  <a:schemeClr val="bg2">
+                    <a:lumMod val="75000"/>
+                  </a:schemeClr>
+                </a:solidFill>
+              </a:rPr>
+              <a:t>// </a:t>
+            </a:r>
+            <a:r>
+              <a:rPr lang="en-US" dirty="0" err="1">
+                <a:solidFill>
+                  <a:schemeClr val="accent6"/>
+                </a:solidFill>
+              </a:rPr>
+              <a:t>z.h</a:t>
+            </a:r>
+            <a:r>
+              <a:rPr lang="en-US" baseline="-25000" dirty="0" err="1">
+                <a:solidFill>
+                  <a:schemeClr val="accent6"/>
+                </a:solidFill>
+              </a:rPr>
+              <a:t>R</a:t>
+            </a:r>
+            <a:r>
+              <a:rPr lang="en-US" dirty="0">
+                <a:solidFill>
+                  <a:schemeClr val="accent6"/>
+                </a:solidFill>
+              </a:rPr>
+              <a:t> &gt; </a:t>
+            </a:r>
+            <a:r>
+              <a:rPr lang="en-US" dirty="0" err="1">
+                <a:solidFill>
+                  <a:schemeClr val="accent6"/>
+                </a:solidFill>
+              </a:rPr>
+              <a:t>z.h</a:t>
+            </a:r>
+            <a:r>
+              <a:rPr lang="en-US" baseline="-25000" dirty="0" err="1">
+                <a:solidFill>
+                  <a:schemeClr val="accent6"/>
+                </a:solidFill>
+              </a:rPr>
+              <a:t>L</a:t>
+            </a:r>
+            <a:r>
+              <a:rPr lang="en-US" dirty="0">
+                <a:solidFill>
+                  <a:schemeClr val="bg2">
+                    <a:lumMod val="75000"/>
+                  </a:schemeClr>
+                </a:solidFill>
+              </a:rPr>
+              <a:t>, </a:t>
+            </a:r>
+            <a:r>
+              <a:rPr lang="en-US" dirty="0">
+                <a:solidFill>
+                  <a:schemeClr val="accent6"/>
+                </a:solidFill>
+              </a:rPr>
+              <a:t>R</a:t>
+            </a:r>
+            <a:r>
+              <a:rPr lang="en-US" dirty="0">
+                <a:solidFill>
+                  <a:schemeClr val="bg2">
+                    <a:lumMod val="75000"/>
+                  </a:schemeClr>
+                </a:solidFill>
+              </a:rPr>
+              <a:t>x case, but need to figure out which</a:t>
+            </a:r>
+          </a:p>
+          <a:p>
+            <a:pPr marL="0" indent="0">
+              <a:buNone/>
+            </a:pPr>
+            <a:r>
+              <a:rPr lang="en-US" dirty="0"/>
+              <a:t>	if </a:t>
+            </a:r>
+            <a:r>
+              <a:rPr lang="en-US" dirty="0" err="1"/>
+              <a:t>z.right.h</a:t>
+            </a:r>
+            <a:r>
+              <a:rPr lang="en-US" baseline="-25000" dirty="0" err="1">
+                <a:solidFill>
+                  <a:schemeClr val="accent2"/>
+                </a:solidFill>
+              </a:rPr>
+              <a:t>L</a:t>
+            </a:r>
+            <a:r>
+              <a:rPr lang="en-US" dirty="0"/>
+              <a:t> &gt; </a:t>
+            </a:r>
+            <a:r>
+              <a:rPr lang="en-US" dirty="0" err="1"/>
+              <a:t>z.right.h</a:t>
+            </a:r>
+            <a:r>
+              <a:rPr lang="en-US" baseline="-25000" dirty="0" err="1"/>
+              <a:t>R</a:t>
+            </a:r>
+            <a:endParaRPr lang="en-US" baseline="-25000" dirty="0"/>
+          </a:p>
+          <a:p>
+            <a:pPr marL="0" indent="0">
+              <a:buNone/>
+            </a:pPr>
+            <a:r>
+              <a:rPr lang="en-US" dirty="0"/>
+              <a:t>		R</a:t>
+            </a:r>
+            <a:r>
+              <a:rPr lang="en-US" dirty="0">
+                <a:solidFill>
+                  <a:schemeClr val="accent2"/>
+                </a:solidFill>
+              </a:rPr>
+              <a:t>L</a:t>
+            </a:r>
+            <a:r>
+              <a:rPr lang="en-US" dirty="0"/>
+              <a:t> case</a:t>
+            </a:r>
+          </a:p>
+          <a:p>
+            <a:pPr marL="0" indent="0">
+              <a:buNone/>
+            </a:pPr>
+            <a:r>
+              <a:rPr lang="en-US" dirty="0"/>
+              <a:t>	else</a:t>
+            </a:r>
+          </a:p>
+          <a:p>
+            <a:pPr marL="0" indent="0">
+              <a:buNone/>
+            </a:pPr>
+            <a:r>
+              <a:rPr lang="en-US" dirty="0"/>
+              <a:t>		RR case</a:t>
+            </a:r>
+          </a:p>
+          <a:p>
+            <a:pPr marL="0" indent="0">
+              <a:buNone/>
+            </a:pPr>
+            <a:endParaRPr lang="en-US" dirty="0"/>
+          </a:p>
+          <a:p>
+            <a:r>
+              <a:rPr lang="en-US" dirty="0"/>
+              <a:t>Once you have the case, it is trivial to identify </a:t>
+            </a:r>
+            <a:r>
+              <a:rPr lang="en-US" dirty="0">
+                <a:highlight>
+                  <a:srgbClr val="FF00FF"/>
+                </a:highlight>
+              </a:rPr>
+              <a:t>z</a:t>
+            </a:r>
+            <a:r>
+              <a:rPr lang="en-US" dirty="0"/>
+              <a:t>, </a:t>
+            </a:r>
+            <a:r>
+              <a:rPr lang="en-US" dirty="0">
+                <a:highlight>
+                  <a:srgbClr val="00FFFF"/>
+                </a:highlight>
+              </a:rPr>
+              <a:t>x</a:t>
+            </a:r>
+            <a:r>
+              <a:rPr lang="en-US" dirty="0"/>
+              <a:t>, and </a:t>
+            </a:r>
+            <a:r>
+              <a:rPr lang="en-US" dirty="0">
+                <a:highlight>
+                  <a:srgbClr val="00FFFF"/>
+                </a:highlight>
+              </a:rPr>
+              <a:t>y</a:t>
+            </a:r>
+            <a:r>
+              <a:rPr lang="en-US" dirty="0"/>
+              <a:t> in our diagrams. Fix the case as usual, but continue to overall root to check any other imbalances (unlike insertion)</a:t>
+            </a:r>
+          </a:p>
+          <a:p>
+            <a:r>
+              <a:rPr lang="en-US" dirty="0"/>
+              <a:t>This algorithm is derived from our 4 diagrams and also holds for insertion (did not use it earlier because case recognition is easy for insertion without this algorithm)</a:t>
             </a:r>
           </a:p>
         </p:txBody>
       </p:sp>
-      <p:pic>
-        <p:nvPicPr>
-          <p:cNvPr id="5" name="Content Placeholder 12">
-            <a:extLst>
-              <a:ext uri="{FF2B5EF4-FFF2-40B4-BE49-F238E27FC236}">
-                <a16:creationId xmlns:a16="http://schemas.microsoft.com/office/drawing/2014/main" id="{46869D2A-B9A9-A18F-9F89-7336450F7071}"/>
-              </a:ext>
-            </a:extLst>
-          </p:cNvPr>
-          <p:cNvPicPr>
-            <a:picLocks noChangeAspect="1"/>
-          </p:cNvPicPr>
-          <p:nvPr/>
-        </p:nvPicPr>
-        <p:blipFill>
-          <a:blip r:embed="rId2">
-            <a:extLst>
-              <a:ext uri="{28A0092B-C50C-407E-A947-70E740481C1C}">
-                <a14:useLocalDpi xmlns:a14="http://schemas.microsoft.com/office/drawing/2010/main" val="0"/>
-              </a:ext>
-            </a:extLst>
-          </a:blip>
-          <a:stretch>
-            <a:fillRect/>
-          </a:stretch>
-        </p:blipFill>
-        <p:spPr>
-          <a:xfrm>
-            <a:off x="5697905" y="1466585"/>
-            <a:ext cx="6494095" cy="3924829"/>
-          </a:xfrm>
-          <a:prstGeom prst="rect">
-            <a:avLst/>
-          </a:prstGeom>
-        </p:spPr>
-      </p:pic>
     </p:spTree>
     <p:extLst>
       <p:ext uri="{BB962C8B-B14F-4D97-AF65-F5344CB8AC3E}">
-        <p14:creationId xmlns:p14="http://schemas.microsoft.com/office/powerpoint/2010/main" val="3540449028"/>
+        <p14:creationId xmlns:p14="http://schemas.microsoft.com/office/powerpoint/2010/main" val="1971063275"/>
       </p:ext>
     </p:extLst>
   </p:cSld>
@@ -33986,7 +34454,7 @@
           <p:cNvPr id="2" name="Title 1">
             <a:extLst>
               <a:ext uri="{FF2B5EF4-FFF2-40B4-BE49-F238E27FC236}">
-                <a16:creationId xmlns:a16="http://schemas.microsoft.com/office/drawing/2014/main" id="{CA0F4C24-4578-160B-0F23-1F779CA6E59C}"/>
+                <a16:creationId xmlns:a16="http://schemas.microsoft.com/office/drawing/2014/main" id="{743F05EF-66C4-BB26-FED6-D230C1394EB3}"/>
               </a:ext>
             </a:extLst>
           </p:cNvPr>
@@ -34014,7 +34482,7 @@
           <p:cNvPr id="3" name="Content Placeholder 2">
             <a:extLst>
               <a:ext uri="{FF2B5EF4-FFF2-40B4-BE49-F238E27FC236}">
-                <a16:creationId xmlns:a16="http://schemas.microsoft.com/office/drawing/2014/main" id="{7F11BC3A-F060-7F65-F564-9C8A25F94FCA}"/>
+                <a16:creationId xmlns:a16="http://schemas.microsoft.com/office/drawing/2014/main" id="{C8E668C4-1BB2-BA4D-B704-5B0041EA5E37}"/>
               </a:ext>
             </a:extLst>
           </p:cNvPr>
@@ -34037,29 +34505,17 @@
           <a:p>
             <a:r>
               <a:rPr lang="en-US" dirty="0"/>
-              <a:t>AVL balance does not create complete BT’s</a:t>
-            </a:r>
-          </a:p>
-          <a:p>
-            <a:r>
-              <a:rPr lang="en-US" dirty="0"/>
-              <a:t>Here’s a valid AVL tree</a:t>
-            </a:r>
-          </a:p>
-          <a:p>
-            <a:r>
-              <a:rPr lang="en-US" dirty="0"/>
-              <a:t>Check out the path lengths root to leaf, do any differ by more than 1?</a:t>
+              <a:t>In a complete BT, paths root to leaf differ by at most 1</a:t>
             </a:r>
           </a:p>
         </p:txBody>
       </p:sp>
       <p:pic>
         <p:nvPicPr>
-          <p:cNvPr id="4" name="Content Placeholder 3">
-            <a:extLst>
-              <a:ext uri="{FF2B5EF4-FFF2-40B4-BE49-F238E27FC236}">
-                <a16:creationId xmlns:a16="http://schemas.microsoft.com/office/drawing/2014/main" id="{1BC49ACC-F570-23A4-9B3A-5EDFB7A0D204}"/>
+          <p:cNvPr id="5" name="Content Placeholder 12">
+            <a:extLst>
+              <a:ext uri="{FF2B5EF4-FFF2-40B4-BE49-F238E27FC236}">
+                <a16:creationId xmlns:a16="http://schemas.microsoft.com/office/drawing/2014/main" id="{46869D2A-B9A9-A18F-9F89-7336450F7071}"/>
               </a:ext>
             </a:extLst>
           </p:cNvPr>
@@ -34082,8 +34538,8 @@
         </p:blipFill>
         <p:spPr>
           <a:xfrm>
-            <a:off x="6096000" y="1690688"/>
-            <a:ext cx="5928208" cy="3849554"/>
+            <a:off x="5697905" y="1466585"/>
+            <a:ext cx="6494095" cy="3924829"/>
           </a:xfrm>
           <a:prstGeom prst="rect">
             <a:avLst/>
@@ -34093,7 +34549,7 @@
     </p:spTree>
     <p:extLst>
       <p:ext uri="{BB962C8B-B14F-4D97-AF65-F5344CB8AC3E}">
-        <p14:creationId xmlns:p14="http://schemas.microsoft.com/office/powerpoint/2010/main" val="1764366778"/>
+        <p14:creationId xmlns:p14="http://schemas.microsoft.com/office/powerpoint/2010/main" val="3540449028"/>
       </p:ext>
     </p:extLst>
   </p:cSld>
@@ -34225,6 +34681,145 @@
 </file>
 
 <file path=ppt/slides/slide30.xml><?xml version="1.0" encoding="utf-8"?>
+<p:sld xmlns:a="http://schemas.openxmlformats.org/drawingml/2006/main" xmlns:r="http://schemas.openxmlformats.org/officeDocument/2006/relationships" xmlns:p="http://schemas.openxmlformats.org/presentationml/2006/main">
+  <p:cSld>
+    <p:spTree>
+      <p:nvGrpSpPr>
+        <p:cNvPr id="1" name=""/>
+        <p:cNvGrpSpPr/>
+        <p:nvPr/>
+      </p:nvGrpSpPr>
+      <p:grpSpPr>
+        <a:xfrm>
+          <a:off x="0" y="0"/>
+          <a:ext cx="0" cy="0"/>
+          <a:chOff x="0" y="0"/>
+          <a:chExt cx="0" cy="0"/>
+        </a:xfrm>
+      </p:grpSpPr>
+      <p:sp>
+        <p:nvSpPr>
+          <p:cNvPr id="2" name="Title 1">
+            <a:extLst>
+              <a:ext uri="{FF2B5EF4-FFF2-40B4-BE49-F238E27FC236}">
+                <a16:creationId xmlns:a16="http://schemas.microsoft.com/office/drawing/2014/main" id="{CA0F4C24-4578-160B-0F23-1F779CA6E59C}"/>
+              </a:ext>
+            </a:extLst>
+          </p:cNvPr>
+          <p:cNvSpPr>
+            <a:spLocks noGrp="1"/>
+          </p:cNvSpPr>
+          <p:nvPr>
+            <p:ph type="title"/>
+          </p:nvPr>
+        </p:nvSpPr>
+        <p:spPr/>
+        <p:txBody>
+          <a:bodyPr/>
+          <a:lstStyle/>
+          <a:p>
+            <a:r>
+              <a:rPr lang="en-US" dirty="0"/>
+              <a:t>AVL path lengths</a:t>
+            </a:r>
+          </a:p>
+        </p:txBody>
+      </p:sp>
+      <p:sp>
+        <p:nvSpPr>
+          <p:cNvPr id="3" name="Content Placeholder 2">
+            <a:extLst>
+              <a:ext uri="{FF2B5EF4-FFF2-40B4-BE49-F238E27FC236}">
+                <a16:creationId xmlns:a16="http://schemas.microsoft.com/office/drawing/2014/main" id="{7F11BC3A-F060-7F65-F564-9C8A25F94FCA}"/>
+              </a:ext>
+            </a:extLst>
+          </p:cNvPr>
+          <p:cNvSpPr>
+            <a:spLocks noGrp="1"/>
+          </p:cNvSpPr>
+          <p:nvPr>
+            <p:ph idx="1"/>
+          </p:nvPr>
+        </p:nvSpPr>
+        <p:spPr>
+          <a:xfrm>
+            <a:off x="838200" y="1825625"/>
+            <a:ext cx="5257800" cy="4351338"/>
+          </a:xfrm>
+        </p:spPr>
+        <p:txBody>
+          <a:bodyPr/>
+          <a:lstStyle/>
+          <a:p>
+            <a:r>
+              <a:rPr lang="en-US" dirty="0"/>
+              <a:t>AVL balance does not create complete BT’s</a:t>
+            </a:r>
+          </a:p>
+          <a:p>
+            <a:r>
+              <a:rPr lang="en-US" dirty="0"/>
+              <a:t>Here’s a valid AVL tree</a:t>
+            </a:r>
+          </a:p>
+          <a:p>
+            <a:r>
+              <a:rPr lang="en-US" dirty="0"/>
+              <a:t>Check out the path lengths root to leaf, do any differ by more than 1?</a:t>
+            </a:r>
+          </a:p>
+        </p:txBody>
+      </p:sp>
+      <p:pic>
+        <p:nvPicPr>
+          <p:cNvPr id="4" name="Content Placeholder 3">
+            <a:extLst>
+              <a:ext uri="{FF2B5EF4-FFF2-40B4-BE49-F238E27FC236}">
+                <a16:creationId xmlns:a16="http://schemas.microsoft.com/office/drawing/2014/main" id="{1BC49ACC-F570-23A4-9B3A-5EDFB7A0D204}"/>
+              </a:ext>
+            </a:extLst>
+          </p:cNvPr>
+          <p:cNvPicPr>
+            <a:picLocks noChangeAspect="1"/>
+          </p:cNvPicPr>
+          <p:nvPr/>
+        </p:nvPicPr>
+        <p:blipFill>
+          <a:blip r:embed="rId2">
+            <a:extLst>
+              <a:ext uri="{28A0092B-C50C-407E-A947-70E740481C1C}">
+                <a14:useLocalDpi xmlns:a14="http://schemas.microsoft.com/office/drawing/2010/main" val="0"/>
+              </a:ext>
+            </a:extLst>
+          </a:blip>
+          <a:stretch>
+            <a:fillRect/>
+          </a:stretch>
+        </p:blipFill>
+        <p:spPr>
+          <a:xfrm>
+            <a:off x="6096000" y="1690688"/>
+            <a:ext cx="5928208" cy="3849554"/>
+          </a:xfrm>
+          <a:prstGeom prst="rect">
+            <a:avLst/>
+          </a:prstGeom>
+        </p:spPr>
+      </p:pic>
+    </p:spTree>
+    <p:extLst>
+      <p:ext uri="{BB962C8B-B14F-4D97-AF65-F5344CB8AC3E}">
+        <p14:creationId xmlns:p14="http://schemas.microsoft.com/office/powerpoint/2010/main" val="1764366778"/>
+      </p:ext>
+    </p:extLst>
+  </p:cSld>
+  <p:clrMapOvr>
+    <a:masterClrMapping/>
+  </p:clrMapOvr>
+</p:sld>
+</file>
+
+<file path=ppt/slides/slide31.xml><?xml version="1.0" encoding="utf-8"?>
 <p:sld xmlns:a="http://schemas.openxmlformats.org/drawingml/2006/main" xmlns:r="http://schemas.openxmlformats.org/officeDocument/2006/relationships" xmlns:p="http://schemas.openxmlformats.org/presentationml/2006/main">
   <p:cSld>
     <p:spTree>
@@ -34787,7 +35382,7 @@
 </p:sld>
 </file>
 
-<file path=ppt/slides/slide31.xml><?xml version="1.0" encoding="utf-8"?>
+<file path=ppt/slides/slide32.xml><?xml version="1.0" encoding="utf-8"?>
 <p:sld xmlns:a="http://schemas.openxmlformats.org/drawingml/2006/main" xmlns:r="http://schemas.openxmlformats.org/officeDocument/2006/relationships" xmlns:p="http://schemas.openxmlformats.org/presentationml/2006/main">
   <p:cSld>
     <p:spTree>
@@ -34857,7 +35452,7 @@
 </p:sld>
 </file>
 
-<file path=ppt/slides/slide32.xml><?xml version="1.0" encoding="utf-8"?>
+<file path=ppt/slides/slide33.xml><?xml version="1.0" encoding="utf-8"?>
 <p:sld xmlns:a="http://schemas.openxmlformats.org/drawingml/2006/main" xmlns:r="http://schemas.openxmlformats.org/officeDocument/2006/relationships" xmlns:p="http://schemas.openxmlformats.org/presentationml/2006/main">
   <p:cSld>
     <p:spTree>
@@ -34926,13 +35521,13 @@
         </p:spPr>
         <p:txBody>
           <a:bodyPr>
-            <a:normAutofit fontScale="92500" lnSpcReduction="20000"/>
+            <a:normAutofit fontScale="92500" lnSpcReduction="10000"/>
           </a:bodyPr>
           <a:lstStyle/>
           <a:p>
             <a:r>
               <a:rPr lang="en-US" dirty="0"/>
-              <a:t>Most details/pseudocode will be given in the EX09 README, similar to EX08</a:t>
+              <a:t>Most details will be given in the EX09 README, similar to EX08</a:t>
             </a:r>
           </a:p>
           <a:p>
@@ -35224,7 +35819,7 @@
 </p:sld>
 </file>
 
-<file path=ppt/slides/slide33.xml><?xml version="1.0" encoding="utf-8"?>
+<file path=ppt/slides/slide34.xml><?xml version="1.0" encoding="utf-8"?>
 <p:sld xmlns:a="http://schemas.openxmlformats.org/drawingml/2006/main" xmlns:r="http://schemas.openxmlformats.org/officeDocument/2006/relationships" xmlns:p="http://schemas.openxmlformats.org/presentationml/2006/main">
   <p:cSld>
     <p:spTree>
@@ -35362,7 +35957,7 @@
 </p:sld>
 </file>
 
-<file path=ppt/slides/slide34.xml><?xml version="1.0" encoding="utf-8"?>
+<file path=ppt/slides/slide35.xml><?xml version="1.0" encoding="utf-8"?>
 <p:sld xmlns:a="http://schemas.openxmlformats.org/drawingml/2006/main" xmlns:r="http://schemas.openxmlformats.org/officeDocument/2006/relationships" xmlns:p="http://schemas.openxmlformats.org/presentationml/2006/main">
   <p:cSld>
     <p:spTree>
@@ -35506,7 +36101,7 @@
 </p:sld>
 </file>
 
-<file path=ppt/slides/slide35.xml><?xml version="1.0" encoding="utf-8"?>
+<file path=ppt/slides/slide36.xml><?xml version="1.0" encoding="utf-8"?>
 <p:sld xmlns:a="http://schemas.openxmlformats.org/drawingml/2006/main" xmlns:r="http://schemas.openxmlformats.org/officeDocument/2006/relationships" xmlns:p="http://schemas.openxmlformats.org/presentationml/2006/main">
   <p:cSld>
     <p:spTree>
@@ -35651,7 +36246,7 @@
 </p:sld>
 </file>
 
-<file path=ppt/slides/slide36.xml><?xml version="1.0" encoding="utf-8"?>
+<file path=ppt/slides/slide37.xml><?xml version="1.0" encoding="utf-8"?>
 <p:sld xmlns:a="http://schemas.openxmlformats.org/drawingml/2006/main" xmlns:r="http://schemas.openxmlformats.org/officeDocument/2006/relationships" xmlns:p="http://schemas.openxmlformats.org/presentationml/2006/main">
   <p:cSld>
     <p:spTree>
@@ -35720,13 +36315,13 @@
         </p:spPr>
         <p:txBody>
           <a:bodyPr>
-            <a:normAutofit fontScale="85000" lnSpcReduction="10000"/>
+            <a:normAutofit fontScale="62500" lnSpcReduction="20000"/>
           </a:bodyPr>
           <a:lstStyle/>
           <a:p>
             <a:r>
               <a:rPr lang="en-US" dirty="0"/>
-              <a:t>Using min of R subtree method, 120 is copied to where the 110 is</a:t>
+              <a:t>Using min of R subtree method, 120 is copied to where the 110 was</a:t>
             </a:r>
           </a:p>
           <a:p>
@@ -35738,7 +36333,14 @@
           <a:p>
             <a:r>
               <a:rPr lang="en-US" dirty="0"/>
-              <a:t>Check for imbalance starting at 130 and going to root, imbalance at 140</a:t>
+              <a:t>Check for imbalance starting at 130 and going to root</a:t>
+            </a:r>
+          </a:p>
+          <a:p>
+            <a:pPr lvl="1"/>
+            <a:r>
+              <a:rPr lang="en-US" dirty="0"/>
+              <a:t>There is imbalance at 140</a:t>
             </a:r>
           </a:p>
           <a:p>
@@ -35748,9 +36350,42 @@
             </a:r>
           </a:p>
           <a:p>
+            <a:pPr lvl="1"/>
+            <a:r>
+              <a:rPr lang="en-US" dirty="0"/>
+              <a:t>Following the case recognition algorithm on </a:t>
+            </a:r>
+            <a:r>
+              <a:rPr lang="en-US" dirty="0">
+                <a:hlinkClick r:id="rId2" action="ppaction://hlinksldjump"/>
+              </a:rPr>
+              <a:t>previous slide</a:t>
+            </a:r>
+            <a:endParaRPr lang="en-US" dirty="0"/>
+          </a:p>
+          <a:p>
+            <a:pPr lvl="1"/>
+            <a:r>
+              <a:rPr lang="en-US" dirty="0"/>
+              <a:t>z=140, y=180, x=160</a:t>
+            </a:r>
+          </a:p>
+          <a:p>
             <a:r>
               <a:rPr lang="en-US" dirty="0"/>
               <a:t>Solve with right-rotate(180), then left-rotate(140)</a:t>
+            </a:r>
+          </a:p>
+          <a:p>
+            <a:r>
+              <a:rPr lang="en-US" dirty="0"/>
+              <a:t>Ancestors also balanced</a:t>
+            </a:r>
+          </a:p>
+          <a:p>
+            <a:r>
+              <a:rPr lang="en-US" dirty="0"/>
+              <a:t>Whole tree is balanced</a:t>
             </a:r>
           </a:p>
           <a:p>
@@ -35776,7 +36411,7 @@
           <p:nvPr/>
         </p:nvPicPr>
         <p:blipFill>
-          <a:blip r:embed="rId2"/>
+          <a:blip r:embed="rId3"/>
           <a:stretch>
             <a:fillRect/>
           </a:stretch>
@@ -35804,7 +36439,7 @@
 </p:sld>
 </file>
 
-<file path=ppt/slides/slide37.xml><?xml version="1.0" encoding="utf-8"?>
+<file path=ppt/slides/slide38.xml><?xml version="1.0" encoding="utf-8"?>
 <p:sld xmlns:a="http://schemas.openxmlformats.org/drawingml/2006/main" xmlns:r="http://schemas.openxmlformats.org/officeDocument/2006/relationships" xmlns:p="http://schemas.openxmlformats.org/presentationml/2006/main">
   <p:cSld>
     <p:spTree>
@@ -35942,100 +36577,6 @@
 </p:sld>
 </file>
 
-<file path=ppt/slides/slide38.xml><?xml version="1.0" encoding="utf-8"?>
-<p:sld xmlns:a="http://schemas.openxmlformats.org/drawingml/2006/main" xmlns:r="http://schemas.openxmlformats.org/officeDocument/2006/relationships" xmlns:p="http://schemas.openxmlformats.org/presentationml/2006/main">
-  <p:cSld>
-    <p:spTree>
-      <p:nvGrpSpPr>
-        <p:cNvPr id="1" name=""/>
-        <p:cNvGrpSpPr/>
-        <p:nvPr/>
-      </p:nvGrpSpPr>
-      <p:grpSpPr>
-        <a:xfrm>
-          <a:off x="0" y="0"/>
-          <a:ext cx="0" cy="0"/>
-          <a:chOff x="0" y="0"/>
-          <a:chExt cx="0" cy="0"/>
-        </a:xfrm>
-      </p:grpSpPr>
-      <p:sp>
-        <p:nvSpPr>
-          <p:cNvPr id="2" name="Title 1">
-            <a:extLst>
-              <a:ext uri="{FF2B5EF4-FFF2-40B4-BE49-F238E27FC236}">
-                <a16:creationId xmlns:a16="http://schemas.microsoft.com/office/drawing/2014/main" id="{6FA20E5F-66A0-3353-8EB1-586CCC0F5FF9}"/>
-              </a:ext>
-            </a:extLst>
-          </p:cNvPr>
-          <p:cNvSpPr>
-            <a:spLocks noGrp="1"/>
-          </p:cNvSpPr>
-          <p:nvPr>
-            <p:ph type="title"/>
-          </p:nvPr>
-        </p:nvSpPr>
-        <p:spPr/>
-        <p:txBody>
-          <a:bodyPr/>
-          <a:lstStyle/>
-          <a:p>
-            <a:r>
-              <a:rPr lang="en-US" dirty="0"/>
-              <a:t>Practice problem 3 solution</a:t>
-            </a:r>
-          </a:p>
-        </p:txBody>
-      </p:sp>
-      <p:sp>
-        <p:nvSpPr>
-          <p:cNvPr id="3" name="Content Placeholder 2">
-            <a:extLst>
-              <a:ext uri="{FF2B5EF4-FFF2-40B4-BE49-F238E27FC236}">
-                <a16:creationId xmlns:a16="http://schemas.microsoft.com/office/drawing/2014/main" id="{A6E3BA29-ED42-D10E-12C1-A117A9ABB9AC}"/>
-              </a:ext>
-            </a:extLst>
-          </p:cNvPr>
-          <p:cNvSpPr>
-            <a:spLocks noGrp="1"/>
-          </p:cNvSpPr>
-          <p:nvPr>
-            <p:ph idx="1"/>
-          </p:nvPr>
-        </p:nvSpPr>
-        <p:spPr/>
-        <p:txBody>
-          <a:bodyPr>
-            <a:normAutofit/>
-          </a:bodyPr>
-          <a:lstStyle/>
-          <a:p>
-            <a:r>
-              <a:rPr lang="en-US" dirty="0"/>
-              <a:t>Remove the 40 normally</a:t>
-            </a:r>
-          </a:p>
-          <a:p>
-            <a:r>
-              <a:rPr lang="en-US" dirty="0"/>
-              <a:t>No rotations required, tree remains balanced</a:t>
-            </a:r>
-          </a:p>
-        </p:txBody>
-      </p:sp>
-    </p:spTree>
-    <p:extLst>
-      <p:ext uri="{BB962C8B-B14F-4D97-AF65-F5344CB8AC3E}">
-        <p14:creationId xmlns:p14="http://schemas.microsoft.com/office/powerpoint/2010/main" val="1425390870"/>
-      </p:ext>
-    </p:extLst>
-  </p:cSld>
-  <p:clrMapOvr>
-    <a:masterClrMapping/>
-  </p:clrMapOvr>
-</p:sld>
-</file>
-
 <file path=ppt/slides/slide39.xml><?xml version="1.0" encoding="utf-8"?>
 <p:sld xmlns:a="http://schemas.openxmlformats.org/drawingml/2006/main" xmlns:r="http://schemas.openxmlformats.org/officeDocument/2006/relationships" xmlns:p="http://schemas.openxmlformats.org/presentationml/2006/main">
   <p:cSld>
@@ -36076,7 +36617,7 @@
           <a:p>
             <a:r>
               <a:rPr lang="en-US" dirty="0"/>
-              <a:t>Another example question</a:t>
+              <a:t>Practice problem 3 solution</a:t>
             </a:r>
           </a:p>
         </p:txBody>
@@ -36106,121 +36647,21 @@
           <a:p>
             <a:r>
               <a:rPr lang="en-US" dirty="0"/>
-              <a:t>You should be able to identify</a:t>
-            </a:r>
-          </a:p>
-          <a:p>
-            <a:pPr lvl="1"/>
+              <a:t>Remove the 40 normally</a:t>
+            </a:r>
+          </a:p>
+          <a:p>
             <a:r>
               <a:rPr lang="en-US" dirty="0"/>
-              <a:t>A value that when inserted will</a:t>
-            </a:r>
-          </a:p>
-          <a:p>
-            <a:pPr lvl="2"/>
-            <a:r>
-              <a:rPr lang="en-US" dirty="0"/>
-              <a:t>not cause a rotation</a:t>
-            </a:r>
-          </a:p>
-          <a:p>
-            <a:pPr lvl="2"/>
-            <a:r>
-              <a:rPr lang="en-US" dirty="0"/>
-              <a:t>cause a single rotation</a:t>
-            </a:r>
-          </a:p>
-          <a:p>
-            <a:pPr lvl="2"/>
-            <a:r>
-              <a:rPr lang="en-US" dirty="0"/>
-              <a:t>cause a double rotation</a:t>
-            </a:r>
-          </a:p>
-          <a:p>
-            <a:pPr lvl="1"/>
-            <a:r>
-              <a:rPr lang="en-US" dirty="0"/>
-              <a:t>A value that when deleted will</a:t>
-            </a:r>
-          </a:p>
-          <a:p>
-            <a:pPr lvl="2"/>
-            <a:r>
-              <a:rPr lang="en-US" dirty="0"/>
-              <a:t>not cause a rotation</a:t>
-            </a:r>
-          </a:p>
-          <a:p>
-            <a:pPr lvl="2"/>
-            <a:r>
-              <a:rPr lang="en-US" dirty="0"/>
-              <a:t>will cause a single rotation</a:t>
-            </a:r>
-          </a:p>
-          <a:p>
-            <a:pPr lvl="2"/>
-            <a:r>
-              <a:rPr lang="en-US" dirty="0"/>
-              <a:t>will cause a double rotation</a:t>
-            </a:r>
-          </a:p>
-          <a:p>
-            <a:endParaRPr lang="en-US" dirty="0"/>
+              <a:t>No rotations required, tree remains balanced</a:t>
+            </a:r>
           </a:p>
         </p:txBody>
       </p:sp>
-      <p:pic>
-        <p:nvPicPr>
-          <p:cNvPr id="3076" name="Picture 4">
-            <a:extLst>
-              <a:ext uri="{FF2B5EF4-FFF2-40B4-BE49-F238E27FC236}">
-                <a16:creationId xmlns:a16="http://schemas.microsoft.com/office/drawing/2014/main" id="{AD349060-657E-8898-1D5C-C0503468D360}"/>
-              </a:ext>
-            </a:extLst>
-          </p:cNvPr>
-          <p:cNvPicPr>
-            <a:picLocks noChangeAspect="1" noChangeArrowheads="1"/>
-          </p:cNvPicPr>
-          <p:nvPr/>
-        </p:nvPicPr>
-        <p:blipFill>
-          <a:blip r:embed="rId2">
-            <a:extLst>
-              <a:ext uri="{28A0092B-C50C-407E-A947-70E740481C1C}">
-                <a14:useLocalDpi xmlns:a14="http://schemas.microsoft.com/office/drawing/2010/main" val="0"/>
-              </a:ext>
-            </a:extLst>
-          </a:blip>
-          <a:srcRect/>
-          <a:stretch>
-            <a:fillRect/>
-          </a:stretch>
-        </p:blipFill>
-        <p:spPr bwMode="auto">
-          <a:xfrm>
-            <a:off x="5510529" y="2928257"/>
-            <a:ext cx="6681472" cy="3929743"/>
-          </a:xfrm>
-          <a:prstGeom prst="rect">
-            <a:avLst/>
-          </a:prstGeom>
-          <a:noFill/>
-          <a:extLst>
-            <a:ext uri="{909E8E84-426E-40DD-AFC4-6F175D3DCCD1}">
-              <a14:hiddenFill xmlns:a14="http://schemas.microsoft.com/office/drawing/2010/main">
-                <a:solidFill>
-                  <a:srgbClr val="FFFFFF"/>
-                </a:solidFill>
-              </a14:hiddenFill>
-            </a:ext>
-          </a:extLst>
-        </p:spPr>
-      </p:pic>
     </p:spTree>
     <p:extLst>
       <p:ext uri="{BB962C8B-B14F-4D97-AF65-F5344CB8AC3E}">
-        <p14:creationId xmlns:p14="http://schemas.microsoft.com/office/powerpoint/2010/main" val="738019593"/>
+        <p14:creationId xmlns:p14="http://schemas.microsoft.com/office/powerpoint/2010/main" val="1425390870"/>
       </p:ext>
     </p:extLst>
   </p:cSld>
@@ -38733,6 +39174,200 @@
 </p:sld>
 </file>
 
+<file path=ppt/slides/slide40.xml><?xml version="1.0" encoding="utf-8"?>
+<p:sld xmlns:a="http://schemas.openxmlformats.org/drawingml/2006/main" xmlns:r="http://schemas.openxmlformats.org/officeDocument/2006/relationships" xmlns:p="http://schemas.openxmlformats.org/presentationml/2006/main">
+  <p:cSld>
+    <p:spTree>
+      <p:nvGrpSpPr>
+        <p:cNvPr id="1" name=""/>
+        <p:cNvGrpSpPr/>
+        <p:nvPr/>
+      </p:nvGrpSpPr>
+      <p:grpSpPr>
+        <a:xfrm>
+          <a:off x="0" y="0"/>
+          <a:ext cx="0" cy="0"/>
+          <a:chOff x="0" y="0"/>
+          <a:chExt cx="0" cy="0"/>
+        </a:xfrm>
+      </p:grpSpPr>
+      <p:sp>
+        <p:nvSpPr>
+          <p:cNvPr id="2" name="Title 1">
+            <a:extLst>
+              <a:ext uri="{FF2B5EF4-FFF2-40B4-BE49-F238E27FC236}">
+                <a16:creationId xmlns:a16="http://schemas.microsoft.com/office/drawing/2014/main" id="{6FA20E5F-66A0-3353-8EB1-586CCC0F5FF9}"/>
+              </a:ext>
+            </a:extLst>
+          </p:cNvPr>
+          <p:cNvSpPr>
+            <a:spLocks noGrp="1"/>
+          </p:cNvSpPr>
+          <p:nvPr>
+            <p:ph type="title"/>
+          </p:nvPr>
+        </p:nvSpPr>
+        <p:spPr/>
+        <p:txBody>
+          <a:bodyPr/>
+          <a:lstStyle/>
+          <a:p>
+            <a:r>
+              <a:rPr lang="en-US" dirty="0"/>
+              <a:t>Another example question</a:t>
+            </a:r>
+          </a:p>
+        </p:txBody>
+      </p:sp>
+      <p:sp>
+        <p:nvSpPr>
+          <p:cNvPr id="3" name="Content Placeholder 2">
+            <a:extLst>
+              <a:ext uri="{FF2B5EF4-FFF2-40B4-BE49-F238E27FC236}">
+                <a16:creationId xmlns:a16="http://schemas.microsoft.com/office/drawing/2014/main" id="{A6E3BA29-ED42-D10E-12C1-A117A9ABB9AC}"/>
+              </a:ext>
+            </a:extLst>
+          </p:cNvPr>
+          <p:cNvSpPr>
+            <a:spLocks noGrp="1"/>
+          </p:cNvSpPr>
+          <p:nvPr>
+            <p:ph idx="1"/>
+          </p:nvPr>
+        </p:nvSpPr>
+        <p:spPr/>
+        <p:txBody>
+          <a:bodyPr>
+            <a:normAutofit/>
+          </a:bodyPr>
+          <a:lstStyle/>
+          <a:p>
+            <a:r>
+              <a:rPr lang="en-US" dirty="0"/>
+              <a:t>You should be able to identify</a:t>
+            </a:r>
+          </a:p>
+          <a:p>
+            <a:pPr lvl="1"/>
+            <a:r>
+              <a:rPr lang="en-US" dirty="0"/>
+              <a:t>A value that when inserted will</a:t>
+            </a:r>
+          </a:p>
+          <a:p>
+            <a:pPr lvl="2"/>
+            <a:r>
+              <a:rPr lang="en-US" dirty="0"/>
+              <a:t>not cause a rotation</a:t>
+            </a:r>
+          </a:p>
+          <a:p>
+            <a:pPr lvl="2"/>
+            <a:r>
+              <a:rPr lang="en-US" dirty="0"/>
+              <a:t>cause a single rotation</a:t>
+            </a:r>
+          </a:p>
+          <a:p>
+            <a:pPr lvl="2"/>
+            <a:r>
+              <a:rPr lang="en-US" dirty="0"/>
+              <a:t>cause a double rotation</a:t>
+            </a:r>
+          </a:p>
+          <a:p>
+            <a:pPr lvl="1"/>
+            <a:r>
+              <a:rPr lang="en-US" dirty="0"/>
+              <a:t>A value that when deleted will</a:t>
+            </a:r>
+          </a:p>
+          <a:p>
+            <a:pPr lvl="2"/>
+            <a:r>
+              <a:rPr lang="en-US" dirty="0"/>
+              <a:t>not cause a rotation</a:t>
+            </a:r>
+          </a:p>
+          <a:p>
+            <a:pPr lvl="2"/>
+            <a:r>
+              <a:rPr lang="en-US" dirty="0"/>
+              <a:t>will cause a single rotation</a:t>
+            </a:r>
+          </a:p>
+          <a:p>
+            <a:pPr lvl="2"/>
+            <a:r>
+              <a:rPr lang="en-US" dirty="0"/>
+              <a:t>will cause a double rotation</a:t>
+            </a:r>
+          </a:p>
+          <a:p>
+            <a:endParaRPr lang="en-US" dirty="0"/>
+          </a:p>
+        </p:txBody>
+      </p:sp>
+      <p:pic>
+        <p:nvPicPr>
+          <p:cNvPr id="3076" name="Picture 4">
+            <a:extLst>
+              <a:ext uri="{FF2B5EF4-FFF2-40B4-BE49-F238E27FC236}">
+                <a16:creationId xmlns:a16="http://schemas.microsoft.com/office/drawing/2014/main" id="{AD349060-657E-8898-1D5C-C0503468D360}"/>
+              </a:ext>
+            </a:extLst>
+          </p:cNvPr>
+          <p:cNvPicPr>
+            <a:picLocks noChangeAspect="1" noChangeArrowheads="1"/>
+          </p:cNvPicPr>
+          <p:nvPr/>
+        </p:nvPicPr>
+        <p:blipFill>
+          <a:blip r:embed="rId2">
+            <a:extLst>
+              <a:ext uri="{28A0092B-C50C-407E-A947-70E740481C1C}">
+                <a14:useLocalDpi xmlns:a14="http://schemas.microsoft.com/office/drawing/2010/main" val="0"/>
+              </a:ext>
+            </a:extLst>
+          </a:blip>
+          <a:srcRect/>
+          <a:stretch>
+            <a:fillRect/>
+          </a:stretch>
+        </p:blipFill>
+        <p:spPr bwMode="auto">
+          <a:xfrm>
+            <a:off x="5510529" y="2928257"/>
+            <a:ext cx="6681472" cy="3929743"/>
+          </a:xfrm>
+          <a:prstGeom prst="rect">
+            <a:avLst/>
+          </a:prstGeom>
+          <a:noFill/>
+          <a:extLst>
+            <a:ext uri="{909E8E84-426E-40DD-AFC4-6F175D3DCCD1}">
+              <a14:hiddenFill xmlns:a14="http://schemas.microsoft.com/office/drawing/2010/main">
+                <a:solidFill>
+                  <a:srgbClr val="FFFFFF"/>
+                </a:solidFill>
+              </a14:hiddenFill>
+            </a:ext>
+          </a:extLst>
+        </p:spPr>
+      </p:pic>
+    </p:spTree>
+    <p:extLst>
+      <p:ext uri="{BB962C8B-B14F-4D97-AF65-F5344CB8AC3E}">
+        <p14:creationId xmlns:p14="http://schemas.microsoft.com/office/powerpoint/2010/main" val="738019593"/>
+      </p:ext>
+    </p:extLst>
+  </p:cSld>
+  <p:clrMapOvr>
+    <a:masterClrMapping/>
+  </p:clrMapOvr>
+</p:sld>
+</file>
+
 <file path=ppt/slides/slide5.xml><?xml version="1.0" encoding="utf-8"?>
 <p:sld xmlns:a="http://schemas.openxmlformats.org/drawingml/2006/main" xmlns:r="http://schemas.openxmlformats.org/officeDocument/2006/relationships" xmlns:p="http://schemas.openxmlformats.org/presentationml/2006/main">
   <p:cSld>

</xml_diff>